<commit_message>
Rerender to fix slow loading.
</commit_message>
<xml_diff>
--- a/docs/slides/wk01-2024-01-11.pptx
+++ b/docs/slides/wk01-2024-01-11.pptx
@@ -3883,10 +3883,206 @@
 </p:sld>
 </file>
 
-<file path=ppt/slides/slide18.xml><?xml version="1.0" encoding="UTF-8"?><p:sld xmlns:a="http://schemas.openxmlformats.org/drawingml/2006/main" xmlns:r="http://schemas.openxmlformats.org/officeDocument/2006/relationships" xmlns:p="http://schemas.openxmlformats.org/presentationml/2006/main"><p:cSld><p:spTree><p:nvGrpSpPr><p:cNvPr id="1" name="" /><p:cNvGrpSpPr /><p:nvPr /></p:nvGrpSpPr><p:grpSpPr><a:xfrm><a:off x="0" y="0" /><a:ext cx="0" cy="0" /><a:chOff x="0" y="0" /><a:chExt cx="0" cy="0" /></a:xfrm></p:grpSpPr><p:sp><p:nvSpPr><p:cNvPr id="2" name="Title 1" /><p:cNvSpPr><a:spLocks noGrp="1" /></p:cNvSpPr><p:nvPr><p:ph type="title" /></p:nvPr></p:nvSpPr><p:spPr /><p:txBody><a:bodyPr /><a:lstStyle /><a:p><a:pPr lvl="0" indent="0" marL="0"><a:buNone /></a:pPr><a:r><a:rPr /><a:t>Mental states (</a:t></a:r><a14:m><m:oMath xmlns:m="http://schemas.openxmlformats.org/officeDocument/2006/math"><m:r><m:t>M</m:t></m:r></m:oMath></a14:m><a:r><a:rPr /><a:t>)</a:t></a:r></a:p></p:txBody></p:sp><mc:AlternateContent xmlns:mc="http://schemas.openxmlformats.org/markup-compatibility/2006"><mc:Choice xmlns:a14="http://schemas.microsoft.com/office/drawing/2010/main" Requires="a14"><p:sp><p:nvSpPr><p:cNvPr id="3" name="Content Placeholder 2" /><p:cNvSpPr><a:spLocks noGrp="1" /></p:cNvSpPr><p:nvPr><p:ph idx="1" /></p:nvPr></p:nvSpPr><p:spPr /><p:txBody><a:bodyPr /><a:lstStyle /><a:p><a:pPr lvl="0" /><a:r><a:rPr /><a:t>Measured </a:t></a:r><a:r><a:rPr b="1" /><a:t>indirectly</a:t></a:r></a:p><a:p><a:pPr lvl="0" /><a:r><a:rPr /><a:t>Via </a:t></a:r><a14:m><m:oMath xmlns:m="http://schemas.openxmlformats.org/officeDocument/2006/math"><m:r><m:t>N</m:t></m:r></m:oMath></a14:m><a:r><a:rPr /><a:t>, </a:t></a:r><a14:m><m:oMath xmlns:m="http://schemas.openxmlformats.org/officeDocument/2006/math"><m:r><m:t>B</m:t></m:r></m:oMath></a14:m><a:r><a:rPr /><a:t>, </a:t></a:r><a14:m><m:oMath xmlns:m="http://schemas.openxmlformats.org/officeDocument/2006/math"><m:r><m:t>W</m:t></m:r></m:oMath></a14:m><a:r><a:rPr /><a:t> (+ prior beliefs/knowledge)</a:t></a:r></a:p><a:p><a:pPr lvl="0" /><a:r><a:rPr /><a:t>Examples?</a:t></a:r></a:p></p:txBody></p:sp></mc:Choice></mc:AlternateContent></p:spTree></p:cSld></p:sld>
+<file path=ppt/slides/slide18.xml><?xml version="1.0" encoding="utf-8"?>
+<p:sld xmlns:a="http://schemas.openxmlformats.org/drawingml/2006/main" xmlns:r="http://schemas.openxmlformats.org/officeDocument/2006/relationships" xmlns:p="http://schemas.openxmlformats.org/presentationml/2006/main">
+  <p:cSld>
+    <p:spTree>
+      <p:nvGrpSpPr>
+        <p:cNvPr id="1" name=""/>
+        <p:cNvGrpSpPr/>
+        <p:nvPr/>
+      </p:nvGrpSpPr>
+      <p:grpSpPr>
+        <a:xfrm>
+          <a:off x="0" y="0"/>
+          <a:ext cx="0" cy="0"/>
+          <a:chOff x="0" y="0"/>
+          <a:chExt cx="0" cy="0"/>
+        </a:xfrm>
+      </p:grpSpPr>
+      <mc:AlternateContent xmlns:mc="http://schemas.openxmlformats.org/markup-compatibility/2006">
+        <mc:Choice xmlns:a14="http://schemas.microsoft.com/office/drawing/2010/main" Requires="a14">
+          <p:sp>
+            <p:nvSpPr>
+              <p:cNvPr id="2" name="Title 1"/>
+              <p:cNvSpPr>
+                <a:spLocks noGrp="1"/>
+              </p:cNvSpPr>
+              <p:nvPr>
+                <p:ph type="title"/>
+              </p:nvPr>
+            </p:nvSpPr>
+            <p:spPr/>
+            <p:txBody>
+              <a:bodyPr/>
+              <a:lstStyle/>
+              <a:p>
+                <a:pPr lvl="0" indent="0" marL="0">
+                  <a:buNone/>
+                </a:pPr>
+                <a:r>
+                  <a:rPr/>
+                  <a:t>Mental states (</a:t>
+                </a:r>
+                <a14:m>
+                  <m:oMath xmlns:m="http://schemas.openxmlformats.org/officeDocument/2006/math">
+                    <m:r>
+                      <m:t>M</m:t>
+                    </m:r>
+                  </m:oMath>
+                </a14:m>
+                <a:r>
+                  <a:rPr/>
+                  <a:t>)</a:t>
+                </a:r>
+              </a:p>
+            </p:txBody>
+          </p:sp>
+        </mc:Choice>
+      </mc:AlternateContent>
+      <mc:AlternateContent xmlns:mc="http://schemas.openxmlformats.org/markup-compatibility/2006">
+        <mc:Choice xmlns:a14="http://schemas.microsoft.com/office/drawing/2010/main" Requires="a14">
+          <p:sp>
+            <p:nvSpPr>
+              <p:cNvPr id="3" name="Content Placeholder 2"/>
+              <p:cNvSpPr>
+                <a:spLocks noGrp="1"/>
+              </p:cNvSpPr>
+              <p:nvPr>
+                <p:ph idx="1"/>
+              </p:nvPr>
+            </p:nvSpPr>
+            <p:spPr/>
+            <p:txBody>
+              <a:bodyPr/>
+              <a:lstStyle/>
+              <a:p>
+                <a:pPr lvl="0"/>
+                <a:r>
+                  <a:rPr/>
+                  <a:t>Measured </a:t>
+                </a:r>
+                <a:r>
+                  <a:rPr b="1"/>
+                  <a:t>indirectly</a:t>
+                </a:r>
+              </a:p>
+              <a:p>
+                <a:pPr lvl="0"/>
+                <a:r>
+                  <a:rPr/>
+                  <a:t>Via </a:t>
+                </a:r>
+                <a14:m>
+                  <m:oMath xmlns:m="http://schemas.openxmlformats.org/officeDocument/2006/math">
+                    <m:r>
+                      <m:t>N</m:t>
+                    </m:r>
+                  </m:oMath>
+                </a14:m>
+                <a:r>
+                  <a:rPr/>
+                  <a:t>, </a:t>
+                </a:r>
+                <a14:m>
+                  <m:oMath xmlns:m="http://schemas.openxmlformats.org/officeDocument/2006/math">
+                    <m:r>
+                      <m:t>B</m:t>
+                    </m:r>
+                  </m:oMath>
+                </a14:m>
+                <a:r>
+                  <a:rPr/>
+                  <a:t>, </a:t>
+                </a:r>
+                <a14:m>
+                  <m:oMath xmlns:m="http://schemas.openxmlformats.org/officeDocument/2006/math">
+                    <m:r>
+                      <m:t>W</m:t>
+                    </m:r>
+                  </m:oMath>
+                </a14:m>
+                <a:r>
+                  <a:rPr/>
+                  <a:t> (+ prior beliefs/knowledge)</a:t>
+                </a:r>
+              </a:p>
+              <a:p>
+                <a:pPr lvl="0"/>
+                <a:r>
+                  <a:rPr/>
+                  <a:t>Examples?</a:t>
+                </a:r>
+              </a:p>
+            </p:txBody>
+          </p:sp>
+        </mc:Choice>
+      </mc:AlternateContent>
+    </p:spTree>
+  </p:cSld>
+</p:sld>
 </file>
 
-<file path=ppt/slides/slide19.xml><?xml version="1.0" encoding="UTF-8"?><p:sld xmlns:a="http://schemas.openxmlformats.org/drawingml/2006/main" xmlns:r="http://schemas.openxmlformats.org/officeDocument/2006/relationships" xmlns:p="http://schemas.openxmlformats.org/presentationml/2006/main"><p:cSld><p:spTree><p:nvGrpSpPr><p:cNvPr id="1" name="" /><p:cNvGrpSpPr /><p:nvPr /></p:nvGrpSpPr><p:grpSpPr><a:xfrm><a:off x="0" y="0" /><a:ext cx="0" cy="0" /><a:chOff x="0" y="0" /><a:chExt cx="0" cy="0" /></a:xfrm></p:grpSpPr><p:sp><p:nvSpPr><p:cNvPr id="2" name="Title 1" /><p:cNvSpPr><a:spLocks noGrp="1" /></p:cNvSpPr><p:nvPr><p:ph type="title" /></p:nvPr></p:nvSpPr><p:spPr /><p:txBody><a:bodyPr /><a:lstStyle /><a:p><a:pPr lvl="0" indent="0" marL="0"><a:buNone /></a:pPr><a:r><a:rPr /><a:t>What are essential components/dimensions of </a:t></a:r><a14:m><m:oMath xmlns:m="http://schemas.openxmlformats.org/officeDocument/2006/math"><m:r><m:t>W</m:t></m:r></m:oMath></a14:m><a:r><a:rPr /><a:t>?</a:t></a:r></a:p></p:txBody></p:sp></p:spTree></p:cSld></p:sld>
+<file path=ppt/slides/slide19.xml><?xml version="1.0" encoding="utf-8"?>
+<p:sld xmlns:a="http://schemas.openxmlformats.org/drawingml/2006/main" xmlns:r="http://schemas.openxmlformats.org/officeDocument/2006/relationships" xmlns:p="http://schemas.openxmlformats.org/presentationml/2006/main">
+  <p:cSld>
+    <p:spTree>
+      <p:nvGrpSpPr>
+        <p:cNvPr id="1" name=""/>
+        <p:cNvGrpSpPr/>
+        <p:nvPr/>
+      </p:nvGrpSpPr>
+      <p:grpSpPr>
+        <a:xfrm>
+          <a:off x="0" y="0"/>
+          <a:ext cx="0" cy="0"/>
+          <a:chOff x="0" y="0"/>
+          <a:chExt cx="0" cy="0"/>
+        </a:xfrm>
+      </p:grpSpPr>
+      <mc:AlternateContent xmlns:mc="http://schemas.openxmlformats.org/markup-compatibility/2006">
+        <mc:Choice xmlns:a14="http://schemas.microsoft.com/office/drawing/2010/main" Requires="a14">
+          <p:sp>
+            <p:nvSpPr>
+              <p:cNvPr id="2" name="Title 1"/>
+              <p:cNvSpPr>
+                <a:spLocks noGrp="1"/>
+              </p:cNvSpPr>
+              <p:nvPr>
+                <p:ph type="title"/>
+              </p:nvPr>
+            </p:nvSpPr>
+            <p:spPr/>
+            <p:txBody>
+              <a:bodyPr/>
+              <a:lstStyle/>
+              <a:p>
+                <a:pPr lvl="0" indent="0" marL="0">
+                  <a:buNone/>
+                </a:pPr>
+                <a:r>
+                  <a:rPr/>
+                  <a:t>What are essential components/dimensions of </a:t>
+                </a:r>
+                <a14:m>
+                  <m:oMath xmlns:m="http://schemas.openxmlformats.org/officeDocument/2006/math">
+                    <m:r>
+                      <m:t>W</m:t>
+                    </m:r>
+                  </m:oMath>
+                </a14:m>
+                <a:r>
+                  <a:rPr/>
+                  <a:t>?</a:t>
+                </a:r>
+              </a:p>
+            </p:txBody>
+          </p:sp>
+        </mc:Choice>
+      </mc:AlternateContent>
+    </p:spTree>
+  </p:cSld>
+</p:sld>
 </file>
 
 <file path=ppt/slides/slide2.xml><?xml version="1.0" encoding="utf-8"?>
@@ -3941,7 +4137,66 @@
 </p:sld>
 </file>
 
-<file path=ppt/slides/slide20.xml><?xml version="1.0" encoding="UTF-8"?><p:sld xmlns:a="http://schemas.openxmlformats.org/drawingml/2006/main" xmlns:r="http://schemas.openxmlformats.org/officeDocument/2006/relationships" xmlns:p="http://schemas.openxmlformats.org/presentationml/2006/main"><p:cSld><p:spTree><p:nvGrpSpPr><p:cNvPr id="1" name="" /><p:cNvGrpSpPr /><p:nvPr /></p:nvGrpSpPr><p:grpSpPr><a:xfrm><a:off x="0" y="0" /><a:ext cx="0" cy="0" /><a:chOff x="0" y="0" /><a:chExt cx="0" cy="0" /></a:xfrm></p:grpSpPr><p:sp><p:nvSpPr><p:cNvPr id="2" name="Title 1" /><p:cNvSpPr><a:spLocks noGrp="1" /></p:cNvSpPr><p:nvPr><p:ph type="title" /></p:nvPr></p:nvSpPr><p:spPr /><p:txBody><a:bodyPr /><a:lstStyle /><a:p><a:pPr lvl="0" indent="0" marL="0"><a:buNone /></a:pPr><a:r><a:rPr /><a:t>What are essential components/dimensions of </a:t></a:r><a14:m><m:oMath xmlns:m="http://schemas.openxmlformats.org/officeDocument/2006/math"><m:r><m:t>B</m:t></m:r></m:oMath></a14:m><a:r><a:rPr /><a:t>?</a:t></a:r></a:p></p:txBody></p:sp></p:spTree></p:cSld></p:sld>
+<file path=ppt/slides/slide20.xml><?xml version="1.0" encoding="utf-8"?>
+<p:sld xmlns:a="http://schemas.openxmlformats.org/drawingml/2006/main" xmlns:r="http://schemas.openxmlformats.org/officeDocument/2006/relationships" xmlns:p="http://schemas.openxmlformats.org/presentationml/2006/main">
+  <p:cSld>
+    <p:spTree>
+      <p:nvGrpSpPr>
+        <p:cNvPr id="1" name=""/>
+        <p:cNvGrpSpPr/>
+        <p:nvPr/>
+      </p:nvGrpSpPr>
+      <p:grpSpPr>
+        <a:xfrm>
+          <a:off x="0" y="0"/>
+          <a:ext cx="0" cy="0"/>
+          <a:chOff x="0" y="0"/>
+          <a:chExt cx="0" cy="0"/>
+        </a:xfrm>
+      </p:grpSpPr>
+      <mc:AlternateContent xmlns:mc="http://schemas.openxmlformats.org/markup-compatibility/2006">
+        <mc:Choice xmlns:a14="http://schemas.microsoft.com/office/drawing/2010/main" Requires="a14">
+          <p:sp>
+            <p:nvSpPr>
+              <p:cNvPr id="2" name="Title 1"/>
+              <p:cNvSpPr>
+                <a:spLocks noGrp="1"/>
+              </p:cNvSpPr>
+              <p:nvPr>
+                <p:ph type="title"/>
+              </p:nvPr>
+            </p:nvSpPr>
+            <p:spPr/>
+            <p:txBody>
+              <a:bodyPr/>
+              <a:lstStyle/>
+              <a:p>
+                <a:pPr lvl="0" indent="0" marL="0">
+                  <a:buNone/>
+                </a:pPr>
+                <a:r>
+                  <a:rPr/>
+                  <a:t>What are essential components/dimensions of </a:t>
+                </a:r>
+                <a14:m>
+                  <m:oMath xmlns:m="http://schemas.openxmlformats.org/officeDocument/2006/math">
+                    <m:r>
+                      <m:t>B</m:t>
+                    </m:r>
+                  </m:oMath>
+                </a14:m>
+                <a:r>
+                  <a:rPr/>
+                  <a:t>?</a:t>
+                </a:r>
+              </a:p>
+            </p:txBody>
+          </p:sp>
+        </mc:Choice>
+      </mc:AlternateContent>
+    </p:spTree>
+  </p:cSld>
+</p:sld>
 </file>
 
 <file path=ppt/slides/slide21.xml><?xml version="1.0" encoding="utf-8"?>
@@ -5429,8 +5684,8 @@
         </p:blipFill>
         <p:spPr bwMode="auto">
           <a:xfrm>
-            <a:off x="3568700" y="990600"/>
-            <a:ext cx="5105400" cy="2819400"/>
+            <a:off x="3568700" y="685800"/>
+            <a:ext cx="5105400" cy="3403600"/>
           </a:xfrm>
           <a:prstGeom prst="rect">
             <a:avLst/>
@@ -7747,7 +8002,7 @@
         <p:spPr bwMode="auto">
           <a:xfrm>
             <a:off x="1612900" y="1193800"/>
-            <a:ext cx="5905500" cy="2882900"/>
+            <a:ext cx="5918200" cy="2882900"/>
           </a:xfrm>
           <a:prstGeom prst="rect">
             <a:avLst/>

</xml_diff>